<commit_message>
Changes to presentation for AND Digital
</commit_message>
<xml_diff>
--- a/AND Digital Presentation.pptx
+++ b/AND Digital Presentation.pptx
@@ -3208,7 +3208,7 @@
           <a:p>
             <a:fld id="{E27A4EB8-1163-4E90-A17B-AE527C3FD0A1}" type="datetimeFigureOut">
               <a:rPr lang="en-GB" smtClean="0"/>
-              <a:t>16/02/2020</a:t>
+              <a:t>17/02/2020</a:t>
             </a:fld>
             <a:endParaRPr lang="en-GB"/>
           </a:p>
@@ -3408,7 +3408,7 @@
           <a:p>
             <a:fld id="{E27A4EB8-1163-4E90-A17B-AE527C3FD0A1}" type="datetimeFigureOut">
               <a:rPr lang="en-GB" smtClean="0"/>
-              <a:t>16/02/2020</a:t>
+              <a:t>17/02/2020</a:t>
             </a:fld>
             <a:endParaRPr lang="en-GB"/>
           </a:p>
@@ -3618,7 +3618,7 @@
           <a:p>
             <a:fld id="{E27A4EB8-1163-4E90-A17B-AE527C3FD0A1}" type="datetimeFigureOut">
               <a:rPr lang="en-GB" smtClean="0"/>
-              <a:t>16/02/2020</a:t>
+              <a:t>17/02/2020</a:t>
             </a:fld>
             <a:endParaRPr lang="en-GB"/>
           </a:p>
@@ -3818,7 +3818,7 @@
           <a:p>
             <a:fld id="{E27A4EB8-1163-4E90-A17B-AE527C3FD0A1}" type="datetimeFigureOut">
               <a:rPr lang="en-GB" smtClean="0"/>
-              <a:t>16/02/2020</a:t>
+              <a:t>17/02/2020</a:t>
             </a:fld>
             <a:endParaRPr lang="en-GB"/>
           </a:p>
@@ -4094,7 +4094,7 @@
           <a:p>
             <a:fld id="{E27A4EB8-1163-4E90-A17B-AE527C3FD0A1}" type="datetimeFigureOut">
               <a:rPr lang="en-GB" smtClean="0"/>
-              <a:t>16/02/2020</a:t>
+              <a:t>17/02/2020</a:t>
             </a:fld>
             <a:endParaRPr lang="en-GB"/>
           </a:p>
@@ -4362,7 +4362,7 @@
           <a:p>
             <a:fld id="{E27A4EB8-1163-4E90-A17B-AE527C3FD0A1}" type="datetimeFigureOut">
               <a:rPr lang="en-GB" smtClean="0"/>
-              <a:t>16/02/2020</a:t>
+              <a:t>17/02/2020</a:t>
             </a:fld>
             <a:endParaRPr lang="en-GB"/>
           </a:p>
@@ -4777,7 +4777,7 @@
           <a:p>
             <a:fld id="{E27A4EB8-1163-4E90-A17B-AE527C3FD0A1}" type="datetimeFigureOut">
               <a:rPr lang="en-GB" smtClean="0"/>
-              <a:t>16/02/2020</a:t>
+              <a:t>17/02/2020</a:t>
             </a:fld>
             <a:endParaRPr lang="en-GB"/>
           </a:p>
@@ -4919,7 +4919,7 @@
           <a:p>
             <a:fld id="{E27A4EB8-1163-4E90-A17B-AE527C3FD0A1}" type="datetimeFigureOut">
               <a:rPr lang="en-GB" smtClean="0"/>
-              <a:t>16/02/2020</a:t>
+              <a:t>17/02/2020</a:t>
             </a:fld>
             <a:endParaRPr lang="en-GB"/>
           </a:p>
@@ -5032,7 +5032,7 @@
           <a:p>
             <a:fld id="{E27A4EB8-1163-4E90-A17B-AE527C3FD0A1}" type="datetimeFigureOut">
               <a:rPr lang="en-GB" smtClean="0"/>
-              <a:t>16/02/2020</a:t>
+              <a:t>17/02/2020</a:t>
             </a:fld>
             <a:endParaRPr lang="en-GB"/>
           </a:p>
@@ -5345,7 +5345,7 @@
           <a:p>
             <a:fld id="{E27A4EB8-1163-4E90-A17B-AE527C3FD0A1}" type="datetimeFigureOut">
               <a:rPr lang="en-GB" smtClean="0"/>
-              <a:t>16/02/2020</a:t>
+              <a:t>17/02/2020</a:t>
             </a:fld>
             <a:endParaRPr lang="en-GB"/>
           </a:p>
@@ -5634,7 +5634,7 @@
           <a:p>
             <a:fld id="{E27A4EB8-1163-4E90-A17B-AE527C3FD0A1}" type="datetimeFigureOut">
               <a:rPr lang="en-GB" smtClean="0"/>
-              <a:t>16/02/2020</a:t>
+              <a:t>17/02/2020</a:t>
             </a:fld>
             <a:endParaRPr lang="en-GB"/>
           </a:p>
@@ -5877,7 +5877,7 @@
           <a:p>
             <a:fld id="{E27A4EB8-1163-4E90-A17B-AE527C3FD0A1}" type="datetimeFigureOut">
               <a:rPr lang="en-GB" smtClean="0"/>
-              <a:t>16/02/2020</a:t>
+              <a:t>17/02/2020</a:t>
             </a:fld>
             <a:endParaRPr lang="en-GB"/>
           </a:p>
@@ -8001,7 +8001,7 @@
         </p:blipFill>
         <p:spPr>
           <a:xfrm>
-            <a:off x="838201" y="2743201"/>
+            <a:off x="838201" y="2452252"/>
             <a:ext cx="1371600" cy="1371600"/>
           </a:xfrm>
           <a:prstGeom prst="rect">
@@ -8033,14 +8033,14 @@
           </p:nvPr>
         </p:nvPicPr>
         <p:blipFill>
-          <a:blip r:embed="rId2">
+          <a:blip r:embed="rId4">
             <a:alphaModFix amt="15000"/>
             <a:extLst>
               <a:ext uri="{28A0092B-C50C-407E-A947-70E740481C1C}">
                 <a14:useLocalDpi xmlns:a14="http://schemas.microsoft.com/office/drawing/2010/main" val="0"/>
               </a:ext>
               <a:ext uri="{96DAC541-7B7A-43D3-8B79-37D633B846F1}">
-                <asvg:svgBlip xmlns:asvg="http://schemas.microsoft.com/office/drawing/2016/SVG/main" r:embed="rId3"/>
+                <asvg:svgBlip xmlns:asvg="http://schemas.microsoft.com/office/drawing/2016/SVG/main" r:embed="rId5"/>
               </a:ext>
             </a:extLst>
           </a:blip>
@@ -10768,7 +10768,7 @@
             </a:pPr>
             <a:r>
               <a:rPr lang="en-GB" dirty="0"/>
-              <a:t>Provide industry specific and commercially focused Digital and product management expertise.</a:t>
+              <a:t>Provide Digital and product management expertise.</a:t>
             </a:r>
           </a:p>
           <a:p>
@@ -10796,50 +10796,6 @@
               <a:rPr lang="en-GB" dirty="0"/>
               <a:t>Design and implement digital organisation, including ways of working and behavioural changes to achieve agility needed.</a:t>
             </a:r>
-          </a:p>
-        </p:txBody>
-      </p:sp>
-      <p:sp>
-        <p:nvSpPr>
-          <p:cNvPr id="6" name="Rectangle 5">
-            <a:extLst>
-              <a:ext uri="{FF2B5EF4-FFF2-40B4-BE49-F238E27FC236}">
-                <a16:creationId xmlns:a16="http://schemas.microsoft.com/office/drawing/2014/main" id="{C637606F-0568-4603-858F-F282D8D7ADF3}"/>
-              </a:ext>
-            </a:extLst>
-          </p:cNvPr>
-          <p:cNvSpPr/>
-          <p:nvPr/>
-        </p:nvSpPr>
-        <p:spPr>
-          <a:xfrm>
-            <a:off x="499109" y="3949600"/>
-            <a:ext cx="6084396" cy="1200329"/>
-          </a:xfrm>
-          <a:prstGeom prst="rect">
-            <a:avLst/>
-          </a:prstGeom>
-        </p:spPr>
-        <p:txBody>
-          <a:bodyPr wrap="square">
-            <a:spAutoFit/>
-          </a:bodyPr>
-          <a:lstStyle/>
-          <a:p>
-            <a:r>
-              <a:rPr lang="en-US" b="0" i="0" dirty="0">
-                <a:solidFill>
-                  <a:srgbClr val="323232"/>
-                </a:solidFill>
-                <a:effectLst/>
-                <a:latin typeface="brown-pro-regular"/>
-              </a:rPr>
-              <a:t>We help you create a vision statement that aligns with the overall business goals and objectives We support the full scope of digital transformation - from end to end.</a:t>
-            </a:r>
-            <a:endParaRPr lang="en-GB" dirty="0"/>
-          </a:p>
-          <a:p>
-            <a:endParaRPr lang="en-GB" dirty="0"/>
           </a:p>
         </p:txBody>
       </p:sp>
@@ -12545,7 +12501,7 @@
         </p:blipFill>
         <p:spPr>
           <a:xfrm>
-            <a:off x="8956684" y="203929"/>
+            <a:off x="8932932" y="203929"/>
             <a:ext cx="752475" cy="885825"/>
           </a:xfrm>
           <a:prstGeom prst="rect">
@@ -14147,8 +14103,8 @@
         </p:nvSpPr>
         <p:spPr>
           <a:xfrm>
-            <a:off x="499109" y="1899997"/>
-            <a:ext cx="8025766" cy="3096360"/>
+            <a:off x="499109" y="1935625"/>
+            <a:ext cx="8025766" cy="2265364"/>
           </a:xfrm>
           <a:prstGeom prst="rect">
             <a:avLst/>
@@ -14165,18 +14121,8 @@
                 <a:effectLst/>
                 <a:latin typeface="brown-pro-regular"/>
               </a:rPr>
-              <a:t>We work in two teams who jointly accelerate digital capability and forge high performance teams and leaders. *</a:t>
+              <a:t>We work in two teams who jointly accelerate digital capability and forge high performance teams and leaders.</a:t>
             </a:r>
-            <a:r>
-              <a:rPr lang="en-US" dirty="0"/>
-              <a:t>We want our people and clients to have the latest and greatest knowledge and capability when it comes to digital, so they can build remarkable digital products.</a:t>
-            </a:r>
-            <a:endParaRPr lang="en-US" b="0" i="0" dirty="0">
-              <a:effectLst/>
-              <a:latin typeface="brown-pro-regular"/>
-            </a:endParaRPr>
-          </a:p>
-          <a:p>
             <a:endParaRPr lang="en-US" dirty="0">
               <a:latin typeface="brown-pro-regular"/>
             </a:endParaRPr>
@@ -15509,18 +15455,26 @@
               <a:buNone/>
             </a:pPr>
             <a:r>
-              <a:rPr lang="en-GB" sz="3200">
+              <a:rPr lang="en-GB" sz="1800" b="1" dirty="0">
                 <a:solidFill>
                   <a:srgbClr val="000000"/>
                 </a:solidFill>
               </a:rPr>
-              <a:t>Agile does not give us decisions but a foundation and values for making them.</a:t>
+              <a:t>How does a team become Agile? </a:t>
             </a:r>
-            <a:endParaRPr lang="en-GB" sz="3200" dirty="0">
-              <a:solidFill>
-                <a:srgbClr val="000000"/>
-              </a:solidFill>
-            </a:endParaRPr>
+          </a:p>
+          <a:p>
+            <a:pPr marL="0" indent="0">
+              <a:buNone/>
+            </a:pPr>
+            <a:r>
+              <a:rPr lang="en-GB" sz="1800" dirty="0">
+                <a:solidFill>
+                  <a:srgbClr val="000000"/>
+                </a:solidFill>
+              </a:rPr>
+              <a:t>They make decisions based on Agile values and principles. The values and principles have enough flexibility to allow teams in a wide variety of organisations to develop software in a way that works best for their particular situation while providing enough direction to help a team continuously move toward their full potential.</a:t>
+            </a:r>
           </a:p>
         </p:txBody>
       </p:sp>

</xml_diff>